<commit_message>
Se modifico la presentacion final, solo falta agregar los diagramas de clases modificados por ignacio
</commit_message>
<xml_diff>
--- a/Presentacion/Presentacion Proyecto Final.pptx
+++ b/Presentacion/Presentacion Proyecto Final.pptx
@@ -117,6 +117,11 @@
       </a:defRPr>
     </a:lvl9pPr>
   </p:defaultTextStyle>
+  <p:extLst>
+    <p:ext uri="{EFAFB233-063F-42B5-8137-9DF3F51BA10A}">
+      <p15:sldGuideLst xmlns:p15="http://schemas.microsoft.com/office/powerpoint/2012/main"/>
+    </p:ext>
+  </p:extLst>
 </p:presentation>
 </file>
 
@@ -7271,10 +7276,36 @@
         </p:nvSpPr>
         <p:spPr/>
         <p:txBody>
-          <a:bodyPr/>
-          <a:lstStyle/>
-          <a:p>
-            <a:endParaRPr lang="es-MX" dirty="0"/>
+          <a:bodyPr anchor="ctr">
+            <a:normAutofit/>
+          </a:bodyPr>
+          <a:lstStyle/>
+          <a:p>
+            <a:pPr algn="ctr"/>
+            <a:r>
+              <a:rPr lang="es-MX" sz="3200" dirty="0" smtClean="0">
+                <a:cs typeface="Arial" panose="020B0604020202020204" pitchFamily="34" charset="0"/>
+              </a:rPr>
+              <a:t>Gracias por su atención.</a:t>
+            </a:r>
+          </a:p>
+          <a:p>
+            <a:pPr algn="ctr"/>
+            <a:endParaRPr lang="es-MX" sz="3200" dirty="0">
+              <a:cs typeface="Arial" panose="020B0604020202020204" pitchFamily="34" charset="0"/>
+            </a:endParaRPr>
+          </a:p>
+          <a:p>
+            <a:pPr algn="ctr"/>
+            <a:r>
+              <a:rPr lang="es-MX" sz="3200" dirty="0" smtClean="0">
+                <a:cs typeface="Arial" panose="020B0604020202020204" pitchFamily="34" charset="0"/>
+              </a:rPr>
+              <a:t>¿Preguntas?</a:t>
+            </a:r>
+            <a:endParaRPr lang="es-MX" sz="3200" dirty="0">
+              <a:cs typeface="Arial" panose="020B0604020202020204" pitchFamily="34" charset="0"/>
+            </a:endParaRPr>
           </a:p>
         </p:txBody>
       </p:sp>
@@ -7355,8 +7386,91 @@
             <a:pPr algn="just"/>
             <a:r>
               <a:rPr lang="es-MX" dirty="0"/>
-              <a:t>Una compañía aérea desea implantar un sistema informático para el control de la asignación de tripulaciones a los diferentes vuelos que opera. Cada tripulación está compuesta por un piloto y un copiloto. El criterio elegido pretende que la tripulación asignada a cada vuelo sea la más adecuada dadas las aptitudes profesionales del piloto y las características del vuelo.</a:t>
-            </a:r>
+              <a:t>Una compañía aérea desea implantar un sistema informático para el control de la asignación de tripulaciones a los diferentes vuelos que opera. </a:t>
+            </a:r>
+            <a:endParaRPr lang="es-MX" dirty="0" smtClean="0"/>
+          </a:p>
+          <a:p>
+            <a:pPr algn="just"/>
+            <a:endParaRPr lang="es-MX" dirty="0" smtClean="0"/>
+          </a:p>
+          <a:p>
+            <a:pPr lvl="1" algn="just"/>
+            <a:r>
+              <a:rPr lang="es-MX" sz="2000" dirty="0" smtClean="0"/>
+              <a:t>Cada </a:t>
+            </a:r>
+            <a:r>
+              <a:rPr lang="es-MX" sz="2000" dirty="0"/>
+              <a:t>tripulación está compuesta por un piloto y un copiloto. </a:t>
+            </a:r>
+            <a:endParaRPr lang="es-MX" sz="2000" dirty="0" smtClean="0"/>
+          </a:p>
+          <a:p>
+            <a:pPr lvl="1" algn="just"/>
+            <a:r>
+              <a:rPr lang="es-MX" sz="2000" dirty="0" smtClean="0"/>
+              <a:t>El personal administrativo podrá registrar nuevos vuelos.</a:t>
+            </a:r>
+            <a:endParaRPr lang="es-MX" sz="2000" dirty="0" smtClean="0"/>
+          </a:p>
+          <a:p>
+            <a:pPr lvl="1" algn="just"/>
+            <a:r>
+              <a:rPr lang="es-MX" sz="2000" dirty="0" smtClean="0"/>
+              <a:t>El Operador decidirá la tripulación </a:t>
+            </a:r>
+            <a:r>
+              <a:rPr lang="es-MX" sz="2000" dirty="0"/>
+              <a:t>asignada a cada </a:t>
+            </a:r>
+            <a:r>
+              <a:rPr lang="es-MX" sz="2000" dirty="0" smtClean="0"/>
+              <a:t>vuelo, si considera que es la </a:t>
+            </a:r>
+            <a:r>
+              <a:rPr lang="es-MX" sz="2000" dirty="0"/>
+              <a:t>más </a:t>
+            </a:r>
+            <a:r>
+              <a:rPr lang="es-MX" sz="2000" dirty="0" smtClean="0"/>
+              <a:t>adecuada, </a:t>
+            </a:r>
+            <a:r>
+              <a:rPr lang="es-MX" sz="2000" dirty="0"/>
+              <a:t>dadas las </a:t>
+            </a:r>
+            <a:r>
+              <a:rPr lang="es-MX" sz="2000" dirty="0" smtClean="0"/>
+              <a:t>calificaciones obtenidas en las simulaciones de vuelo </a:t>
+            </a:r>
+            <a:r>
+              <a:rPr lang="es-MX" sz="2000" dirty="0"/>
+              <a:t>y las características del </a:t>
+            </a:r>
+            <a:r>
+              <a:rPr lang="es-MX" sz="2000" dirty="0" smtClean="0"/>
+              <a:t>vuelo actual.</a:t>
+            </a:r>
+          </a:p>
+          <a:p>
+            <a:pPr lvl="1" algn="just"/>
+            <a:r>
+              <a:rPr lang="es-MX" sz="2000" dirty="0" smtClean="0"/>
+              <a:t>Los pilotos pueden consultar todos los vuelos existentes.</a:t>
+            </a:r>
+          </a:p>
+          <a:p>
+            <a:pPr lvl="1" algn="just"/>
+            <a:endParaRPr lang="es-MX" sz="2000" dirty="0" smtClean="0"/>
+          </a:p>
+          <a:p>
+            <a:pPr algn="just"/>
+            <a:endParaRPr lang="es-MX" dirty="0"/>
+          </a:p>
+          <a:p>
+            <a:pPr algn="just"/>
+            <a:endParaRPr lang="es-MX" dirty="0"/>
           </a:p>
         </p:txBody>
       </p:sp>
@@ -7511,13 +7625,11 @@
       </p:sp>
       <p:pic>
         <p:nvPicPr>
-          <p:cNvPr id="5" name="Marcador de contenido 4"/>
+          <p:cNvPr id="6" name="Imagen 5"/>
           <p:cNvPicPr>
-            <a:picLocks noGrp="1" noChangeAspect="1"/>
+            <a:picLocks noChangeAspect="1"/>
           </p:cNvPicPr>
-          <p:nvPr>
-            <p:ph idx="1"/>
-          </p:nvPr>
+          <p:nvPr/>
         </p:nvPicPr>
         <p:blipFill>
           <a:blip r:embed="rId2">
@@ -7533,9 +7645,12 @@
         </p:blipFill>
         <p:spPr>
           <a:xfrm>
-            <a:off x="3422469" y="1962926"/>
-            <a:ext cx="4479496" cy="3662647"/>
+            <a:off x="2634155" y="1905000"/>
+            <a:ext cx="6560645" cy="4005446"/>
           </a:xfrm>
+          <a:prstGeom prst="rect">
+            <a:avLst/>
+          </a:prstGeom>
         </p:spPr>
       </p:pic>
     </p:spTree>
@@ -7600,13 +7715,11 @@
       </p:sp>
       <p:pic>
         <p:nvPicPr>
-          <p:cNvPr id="5" name="Marcador de contenido 4"/>
+          <p:cNvPr id="3" name="Imagen 2"/>
           <p:cNvPicPr>
-            <a:picLocks noGrp="1" noChangeAspect="1"/>
+            <a:picLocks noChangeAspect="1"/>
           </p:cNvPicPr>
-          <p:nvPr>
-            <p:ph idx="1"/>
-          </p:nvPr>
+          <p:nvPr/>
         </p:nvPicPr>
         <p:blipFill>
           <a:blip r:embed="rId2">
@@ -7622,9 +7735,12 @@
         </p:blipFill>
         <p:spPr>
           <a:xfrm>
-            <a:off x="2710726" y="1985435"/>
-            <a:ext cx="7373799" cy="3079433"/>
+            <a:off x="1961757" y="2384424"/>
+            <a:ext cx="8329445" cy="2416175"/>
           </a:xfrm>
+          <a:prstGeom prst="rect">
+            <a:avLst/>
+          </a:prstGeom>
         </p:spPr>
       </p:pic>
     </p:spTree>

</xml_diff>